<commit_message>
New figures and legends
</commit_message>
<xml_diff>
--- a/ch2_groucho.figures/ch2_groucho.figures.pptx
+++ b/ch2_groucho.figures/ch2_groucho.figures.pptx
@@ -11,11 +11,12 @@
     <p:sldId id="259" r:id="rId5"/>
     <p:sldId id="260" r:id="rId6"/>
     <p:sldId id="261" r:id="rId7"/>
-    <p:sldId id="262" r:id="rId8"/>
-    <p:sldId id="264" r:id="rId9"/>
-    <p:sldId id="263" r:id="rId10"/>
-    <p:sldId id="265" r:id="rId11"/>
-    <p:sldId id="266" r:id="rId12"/>
+    <p:sldId id="264" r:id="rId8"/>
+    <p:sldId id="267" r:id="rId9"/>
+    <p:sldId id="262" r:id="rId10"/>
+    <p:sldId id="263" r:id="rId11"/>
+    <p:sldId id="265" r:id="rId12"/>
+    <p:sldId id="266" r:id="rId13"/>
   </p:sldIdLst>
   <p:sldSz cx="6858000" cy="9144000" type="letter"/>
   <p:notesSz cx="6858000" cy="9144000"/>
@@ -3246,6 +3247,96 @@
           <a:chExt cx="0" cy="0"/>
         </a:xfrm>
       </p:grpSpPr>
+      <p:pic>
+        <p:nvPicPr>
+          <p:cNvPr id="2" name="Picture 1"/>
+          <p:cNvPicPr>
+            <a:picLocks noChangeAspect="1"/>
+          </p:cNvPicPr>
+          <p:nvPr/>
+        </p:nvPicPr>
+        <p:blipFill>
+          <a:blip r:embed="rId2">
+            <a:extLst>
+              <a:ext uri="{28A0092B-C50C-407E-A947-70E740481C1C}">
+                <a14:useLocalDpi xmlns:a14="http://schemas.microsoft.com/office/drawing/2010/main" val="0"/>
+              </a:ext>
+            </a:extLst>
+          </a:blip>
+          <a:stretch>
+            <a:fillRect/>
+          </a:stretch>
+        </p:blipFill>
+        <p:spPr>
+          <a:xfrm>
+            <a:off x="0" y="1917700"/>
+            <a:ext cx="6858000" cy="5299364"/>
+          </a:xfrm>
+          <a:prstGeom prst="rect">
+            <a:avLst/>
+          </a:prstGeom>
+        </p:spPr>
+      </p:pic>
+      <p:sp>
+        <p:nvSpPr>
+          <p:cNvPr id="3" name="TextBox 2"/>
+          <p:cNvSpPr txBox="1"/>
+          <p:nvPr/>
+        </p:nvSpPr>
+        <p:spPr>
+          <a:xfrm>
+            <a:off x="1100380" y="1301858"/>
+            <a:ext cx="803425" cy="369332"/>
+          </a:xfrm>
+          <a:prstGeom prst="rect">
+            <a:avLst/>
+          </a:prstGeom>
+          <a:noFill/>
+        </p:spPr>
+        <p:txBody>
+          <a:bodyPr wrap="none" rtlCol="0">
+            <a:spAutoFit/>
+          </a:bodyPr>
+          <a:lstStyle/>
+          <a:p>
+            <a:r>
+              <a:rPr lang="en-US" dirty="0" smtClean="0"/>
+              <a:t>Fig. 2-i</a:t>
+            </a:r>
+            <a:endParaRPr lang="en-US" dirty="0"/>
+          </a:p>
+        </p:txBody>
+      </p:sp>
+    </p:spTree>
+    <p:extLst>
+      <p:ext uri="{BB962C8B-B14F-4D97-AF65-F5344CB8AC3E}">
+        <p14:creationId xmlns:p14="http://schemas.microsoft.com/office/powerpoint/2010/main" val="362575055"/>
+      </p:ext>
+    </p:extLst>
+  </p:cSld>
+  <p:clrMapOvr>
+    <a:masterClrMapping/>
+  </p:clrMapOvr>
+</p:sld>
+</file>
+
+<file path=ppt/slides/slide11.xml><?xml version="1.0" encoding="utf-8"?>
+<p:sld xmlns:a="http://schemas.openxmlformats.org/drawingml/2006/main" xmlns:r="http://schemas.openxmlformats.org/officeDocument/2006/relationships" xmlns:p="http://schemas.openxmlformats.org/presentationml/2006/main">
+  <p:cSld>
+    <p:spTree>
+      <p:nvGrpSpPr>
+        <p:cNvPr id="1" name=""/>
+        <p:cNvGrpSpPr/>
+        <p:nvPr/>
+      </p:nvGrpSpPr>
+      <p:grpSpPr>
+        <a:xfrm>
+          <a:off x="0" y="0"/>
+          <a:ext cx="0" cy="0"/>
+          <a:chOff x="0" y="0"/>
+          <a:chExt cx="0" cy="0"/>
+        </a:xfrm>
+      </p:grpSpPr>
       <p:grpSp>
         <p:nvGrpSpPr>
           <p:cNvPr id="4" name="Group 3"/>
@@ -3364,7 +3455,7 @@
 </p:sld>
 </file>
 
-<file path=ppt/slides/slide11.xml><?xml version="1.0" encoding="utf-8"?>
+<file path=ppt/slides/slide12.xml><?xml version="1.0" encoding="utf-8"?>
 <p:sld xmlns:a="http://schemas.openxmlformats.org/drawingml/2006/main" xmlns:r="http://schemas.openxmlformats.org/officeDocument/2006/relationships" xmlns:p="http://schemas.openxmlformats.org/presentationml/2006/main">
   <p:cSld>
     <p:spTree>
@@ -3435,11 +3526,7 @@
           <a:p>
             <a:r>
               <a:rPr lang="en-US" dirty="0" smtClean="0"/>
-              <a:t>Fig. </a:t>
-            </a:r>
-            <a:r>
-              <a:rPr lang="en-US" smtClean="0"/>
-              <a:t>2-j (continued)</a:t>
+              <a:t>Fig. 2-j (continued)</a:t>
             </a:r>
             <a:endParaRPr lang="en-US" dirty="0"/>
           </a:p>
@@ -4059,7 +4146,7 @@
       </p:grpSpPr>
       <p:pic>
         <p:nvPicPr>
-          <p:cNvPr id="2" name="Picture 1"/>
+          <p:cNvPr id="16" name="Picture 15"/>
           <p:cNvPicPr>
             <a:picLocks noChangeAspect="1"/>
           </p:cNvPicPr>
@@ -4079,8 +4166,8 @@
         </p:blipFill>
         <p:spPr>
           <a:xfrm>
-            <a:off x="1332855" y="2324746"/>
-            <a:ext cx="4374581" cy="3827758"/>
+            <a:off x="1028504" y="4499264"/>
+            <a:ext cx="5251853" cy="4058250"/>
           </a:xfrm>
           <a:prstGeom prst="rect">
             <a:avLst/>
@@ -4095,7 +4182,7 @@
         </p:nvSpPr>
         <p:spPr>
           <a:xfrm>
-            <a:off x="1193369" y="1270861"/>
+            <a:off x="598739" y="699568"/>
             <a:ext cx="865943" cy="369332"/>
           </a:xfrm>
           <a:prstGeom prst="rect">
@@ -4117,6 +4204,157 @@
           </a:p>
         </p:txBody>
       </p:sp>
+      <p:sp>
+        <p:nvSpPr>
+          <p:cNvPr id="7" name="TextBox 6"/>
+          <p:cNvSpPr txBox="1"/>
+          <p:nvPr/>
+        </p:nvSpPr>
+        <p:spPr>
+          <a:xfrm>
+            <a:off x="887279" y="1391296"/>
+            <a:ext cx="288862" cy="307777"/>
+          </a:xfrm>
+          <a:prstGeom prst="rect">
+            <a:avLst/>
+          </a:prstGeom>
+          <a:noFill/>
+        </p:spPr>
+        <p:txBody>
+          <a:bodyPr wrap="none" rtlCol="0">
+            <a:spAutoFit/>
+          </a:bodyPr>
+          <a:lstStyle/>
+          <a:p>
+            <a:r>
+              <a:rPr lang="en-US" sz="1400" dirty="0" smtClean="0"/>
+              <a:t>A</a:t>
+            </a:r>
+            <a:endParaRPr lang="en-US" sz="1400" dirty="0"/>
+          </a:p>
+        </p:txBody>
+      </p:sp>
+      <p:sp>
+        <p:nvSpPr>
+          <p:cNvPr id="10" name="TextBox 9"/>
+          <p:cNvSpPr txBox="1"/>
+          <p:nvPr/>
+        </p:nvSpPr>
+        <p:spPr>
+          <a:xfrm>
+            <a:off x="887279" y="5219054"/>
+            <a:ext cx="282450" cy="307777"/>
+          </a:xfrm>
+          <a:prstGeom prst="rect">
+            <a:avLst/>
+          </a:prstGeom>
+          <a:noFill/>
+        </p:spPr>
+        <p:txBody>
+          <a:bodyPr wrap="none" rtlCol="0">
+            <a:spAutoFit/>
+          </a:bodyPr>
+          <a:lstStyle/>
+          <a:p>
+            <a:r>
+              <a:rPr lang="en-US" sz="1400" dirty="0"/>
+              <a:t>B</a:t>
+            </a:r>
+            <a:endParaRPr lang="en-US" sz="1400" dirty="0"/>
+          </a:p>
+        </p:txBody>
+      </p:sp>
+      <p:grpSp>
+        <p:nvGrpSpPr>
+          <p:cNvPr id="12" name="Group 11"/>
+          <p:cNvGrpSpPr/>
+          <p:nvPr/>
+        </p:nvGrpSpPr>
+        <p:grpSpPr>
+          <a:xfrm>
+            <a:off x="1169729" y="1330837"/>
+            <a:ext cx="4374581" cy="3827758"/>
+            <a:chOff x="1464682" y="1391296"/>
+            <a:chExt cx="4374581" cy="3827758"/>
+          </a:xfrm>
+        </p:grpSpPr>
+        <p:pic>
+          <p:nvPicPr>
+            <p:cNvPr id="2" name="Picture 1"/>
+            <p:cNvPicPr>
+              <a:picLocks noChangeAspect="1"/>
+            </p:cNvPicPr>
+            <p:nvPr/>
+          </p:nvPicPr>
+          <p:blipFill>
+            <a:blip r:embed="rId3">
+              <a:extLst>
+                <a:ext uri="{28A0092B-C50C-407E-A947-70E740481C1C}">
+                  <a14:useLocalDpi xmlns:a14="http://schemas.microsoft.com/office/drawing/2010/main" val="0"/>
+                </a:ext>
+              </a:extLst>
+            </a:blip>
+            <a:stretch>
+              <a:fillRect/>
+            </a:stretch>
+          </p:blipFill>
+          <p:spPr>
+            <a:xfrm>
+              <a:off x="1464682" y="1391296"/>
+              <a:ext cx="4374581" cy="3827758"/>
+            </a:xfrm>
+            <a:prstGeom prst="rect">
+              <a:avLst/>
+            </a:prstGeom>
+          </p:spPr>
+        </p:pic>
+        <p:sp>
+          <p:nvSpPr>
+            <p:cNvPr id="11" name="Rectangle 10"/>
+            <p:cNvSpPr/>
+            <p:nvPr/>
+          </p:nvSpPr>
+          <p:spPr>
+            <a:xfrm>
+              <a:off x="1464682" y="1391296"/>
+              <a:ext cx="1108037" cy="2235307"/>
+            </a:xfrm>
+            <a:prstGeom prst="rect">
+              <a:avLst/>
+            </a:prstGeom>
+            <a:solidFill>
+              <a:schemeClr val="bg1"/>
+            </a:solidFill>
+            <a:ln>
+              <a:solidFill>
+                <a:schemeClr val="bg1"/>
+              </a:solidFill>
+            </a:ln>
+          </p:spPr>
+          <p:style>
+            <a:lnRef idx="2">
+              <a:schemeClr val="accent6"/>
+            </a:lnRef>
+            <a:fillRef idx="1001">
+              <a:schemeClr val="lt1"/>
+            </a:fillRef>
+            <a:effectRef idx="0">
+              <a:schemeClr val="accent6"/>
+            </a:effectRef>
+            <a:fontRef idx="minor">
+              <a:schemeClr val="dk1"/>
+            </a:fontRef>
+          </p:style>
+          <p:txBody>
+            <a:bodyPr rtlCol="0" anchor="ctr"/>
+            <a:lstStyle/>
+            <a:p>
+              <a:pPr algn="ctr"/>
+              <a:endParaRPr lang="en-US"/>
+            </a:p>
+          </p:txBody>
+        </p:sp>
+      </p:grpSp>
     </p:spTree>
     <p:extLst>
       <p:ext uri="{BB962C8B-B14F-4D97-AF65-F5344CB8AC3E}">
@@ -4149,7 +4387,7 @@
       </p:grpSpPr>
       <p:pic>
         <p:nvPicPr>
-          <p:cNvPr id="2" name="Picture 1"/>
+          <p:cNvPr id="11" name="Picture 10"/>
           <p:cNvPicPr>
             <a:picLocks noChangeAspect="1"/>
           </p:cNvPicPr>
@@ -4169,8 +4407,8 @@
         </p:blipFill>
         <p:spPr>
           <a:xfrm>
-            <a:off x="1464681" y="1487515"/>
-            <a:ext cx="3924946" cy="3924946"/>
+            <a:off x="748146" y="835595"/>
+            <a:ext cx="6000645" cy="7765541"/>
           </a:xfrm>
           <a:prstGeom prst="rect">
             <a:avLst/>
@@ -4185,7 +4423,7 @@
         </p:nvSpPr>
         <p:spPr>
           <a:xfrm>
-            <a:off x="1464681" y="650929"/>
+            <a:off x="905692" y="466263"/>
             <a:ext cx="819199" cy="369332"/>
           </a:xfrm>
           <a:prstGeom prst="rect">
@@ -4204,6 +4442,54 @@
               <a:t>Fig. 2-f</a:t>
             </a:r>
             <a:endParaRPr lang="en-US" dirty="0"/>
+          </a:p>
+        </p:txBody>
+      </p:sp>
+      <p:sp>
+        <p:nvSpPr>
+          <p:cNvPr id="10" name="Rectangle 9"/>
+          <p:cNvSpPr/>
+          <p:nvPr/>
+        </p:nvSpPr>
+        <p:spPr>
+          <a:xfrm>
+            <a:off x="1246910" y="1134563"/>
+            <a:ext cx="955963" cy="7348138"/>
+          </a:xfrm>
+          <a:prstGeom prst="rect">
+            <a:avLst/>
+          </a:prstGeom>
+          <a:solidFill>
+            <a:schemeClr val="bg1"/>
+          </a:solidFill>
+          <a:ln>
+            <a:solidFill>
+              <a:schemeClr val="bg1"/>
+            </a:solidFill>
+          </a:ln>
+        </p:spPr>
+        <p:style>
+          <a:lnRef idx="2">
+            <a:schemeClr val="accent1">
+              <a:shade val="50000"/>
+            </a:schemeClr>
+          </a:lnRef>
+          <a:fillRef idx="1">
+            <a:schemeClr val="accent1"/>
+          </a:fillRef>
+          <a:effectRef idx="0">
+            <a:schemeClr val="accent1"/>
+          </a:effectRef>
+          <a:fontRef idx="minor">
+            <a:schemeClr val="lt1"/>
+          </a:fontRef>
+        </p:style>
+        <p:txBody>
+          <a:bodyPr rtlCol="0" anchor="ctr"/>
+          <a:lstStyle/>
+          <a:p>
+            <a:pPr algn="ctr"/>
+            <a:endParaRPr lang="en-US"/>
           </a:p>
         </p:txBody>
       </p:sp>
@@ -4237,9 +4523,38 @@
           <a:chExt cx="0" cy="0"/>
         </a:xfrm>
       </p:grpSpPr>
+      <p:sp>
+        <p:nvSpPr>
+          <p:cNvPr id="4" name="TextBox 3"/>
+          <p:cNvSpPr txBox="1"/>
+          <p:nvPr/>
+        </p:nvSpPr>
+        <p:spPr>
+          <a:xfrm>
+            <a:off x="1146875" y="557939"/>
+            <a:ext cx="859531" cy="369332"/>
+          </a:xfrm>
+          <a:prstGeom prst="rect">
+            <a:avLst/>
+          </a:prstGeom>
+          <a:noFill/>
+        </p:spPr>
+        <p:txBody>
+          <a:bodyPr wrap="none" rtlCol="0">
+            <a:spAutoFit/>
+          </a:bodyPr>
+          <a:lstStyle/>
+          <a:p>
+            <a:r>
+              <a:rPr lang="en-US" dirty="0" smtClean="0"/>
+              <a:t>Fig. 2-g</a:t>
+            </a:r>
+          </a:p>
+        </p:txBody>
+      </p:sp>
       <p:pic>
         <p:nvPicPr>
-          <p:cNvPr id="2" name="Picture 1"/>
+          <p:cNvPr id="5" name="Picture 4"/>
           <p:cNvPicPr>
             <a:picLocks noChangeAspect="1"/>
           </p:cNvPicPr>
@@ -4259,48 +4574,18 @@
         </p:blipFill>
         <p:spPr>
           <a:xfrm>
-            <a:off x="1065509" y="1518832"/>
-            <a:ext cx="4750231" cy="4750231"/>
+            <a:off x="467591" y="1548246"/>
+            <a:ext cx="6206565" cy="4795982"/>
           </a:xfrm>
           <a:prstGeom prst="rect">
             <a:avLst/>
           </a:prstGeom>
         </p:spPr>
       </p:pic>
-      <p:sp>
-        <p:nvSpPr>
-          <p:cNvPr id="3" name="TextBox 2"/>
-          <p:cNvSpPr txBox="1"/>
-          <p:nvPr/>
-        </p:nvSpPr>
-        <p:spPr>
-          <a:xfrm>
-            <a:off x="1208868" y="697424"/>
-            <a:ext cx="859531" cy="369332"/>
-          </a:xfrm>
-          <a:prstGeom prst="rect">
-            <a:avLst/>
-          </a:prstGeom>
-          <a:noFill/>
-        </p:spPr>
-        <p:txBody>
-          <a:bodyPr wrap="none" rtlCol="0">
-            <a:spAutoFit/>
-          </a:bodyPr>
-          <a:lstStyle/>
-          <a:p>
-            <a:r>
-              <a:rPr lang="en-US" dirty="0" smtClean="0"/>
-              <a:t>Fig. 2-g</a:t>
-            </a:r>
-            <a:endParaRPr lang="en-US" dirty="0"/>
-          </a:p>
-        </p:txBody>
-      </p:sp>
     </p:spTree>
     <p:extLst>
       <p:ext uri="{BB962C8B-B14F-4D97-AF65-F5344CB8AC3E}">
-        <p14:creationId xmlns:p14="http://schemas.microsoft.com/office/powerpoint/2010/main" val="120306710"/>
+        <p14:creationId xmlns:p14="http://schemas.microsoft.com/office/powerpoint/2010/main" val="94307398"/>
       </p:ext>
     </p:extLst>
   </p:cSld>
@@ -4349,8 +4634,8 @@
         </p:blipFill>
         <p:spPr>
           <a:xfrm>
-            <a:off x="697424" y="976178"/>
-            <a:ext cx="5749871" cy="4443082"/>
+            <a:off x="555199" y="2130137"/>
+            <a:ext cx="5907945" cy="3417481"/>
           </a:xfrm>
           <a:prstGeom prst="rect">
             <a:avLst/>
@@ -4359,14 +4644,14 @@
       </p:pic>
       <p:sp>
         <p:nvSpPr>
-          <p:cNvPr id="4" name="TextBox 3"/>
+          <p:cNvPr id="3" name="TextBox 2"/>
           <p:cNvSpPr txBox="1"/>
           <p:nvPr/>
         </p:nvSpPr>
         <p:spPr>
           <a:xfrm>
             <a:off x="1146875" y="557939"/>
-            <a:ext cx="872355" cy="369332"/>
+            <a:ext cx="854721" cy="369332"/>
           </a:xfrm>
           <a:prstGeom prst="rect">
             <a:avLst/>
@@ -4381,7 +4666,7 @@
           <a:p>
             <a:r>
               <a:rPr lang="en-US" dirty="0" smtClean="0"/>
-              <a:t>Fig. 2-h</a:t>
+              <a:t>Fig. 2-k</a:t>
             </a:r>
           </a:p>
         </p:txBody>
@@ -4389,7 +4674,7 @@
     </p:spTree>
     <p:extLst>
       <p:ext uri="{BB962C8B-B14F-4D97-AF65-F5344CB8AC3E}">
-        <p14:creationId xmlns:p14="http://schemas.microsoft.com/office/powerpoint/2010/main" val="94307398"/>
+        <p14:creationId xmlns:p14="http://schemas.microsoft.com/office/powerpoint/2010/main" val="234576987"/>
       </p:ext>
     </p:extLst>
   </p:cSld>
@@ -4416,9 +4701,39 @@
           <a:chExt cx="0" cy="0"/>
         </a:xfrm>
       </p:grpSpPr>
+      <p:sp>
+        <p:nvSpPr>
+          <p:cNvPr id="3" name="TextBox 2"/>
+          <p:cNvSpPr txBox="1"/>
+          <p:nvPr/>
+        </p:nvSpPr>
+        <p:spPr>
+          <a:xfrm>
+            <a:off x="1208868" y="697424"/>
+            <a:ext cx="872355" cy="369332"/>
+          </a:xfrm>
+          <a:prstGeom prst="rect">
+            <a:avLst/>
+          </a:prstGeom>
+          <a:noFill/>
+        </p:spPr>
+        <p:txBody>
+          <a:bodyPr wrap="none" rtlCol="0">
+            <a:spAutoFit/>
+          </a:bodyPr>
+          <a:lstStyle/>
+          <a:p>
+            <a:r>
+              <a:rPr lang="en-US" dirty="0" smtClean="0"/>
+              <a:t>Fig. 2-h</a:t>
+            </a:r>
+            <a:endParaRPr lang="en-US" dirty="0"/>
+          </a:p>
+        </p:txBody>
+      </p:sp>
       <p:pic>
         <p:nvPicPr>
-          <p:cNvPr id="2" name="Picture 1"/>
+          <p:cNvPr id="4" name="Picture 3"/>
           <p:cNvPicPr>
             <a:picLocks noChangeAspect="1"/>
           </p:cNvPicPr>
@@ -4438,48 +4753,18 @@
         </p:blipFill>
         <p:spPr>
           <a:xfrm>
-            <a:off x="0" y="1917700"/>
-            <a:ext cx="6858000" cy="5299364"/>
+            <a:off x="810491" y="1066756"/>
+            <a:ext cx="5518672" cy="6817183"/>
           </a:xfrm>
           <a:prstGeom prst="rect">
             <a:avLst/>
           </a:prstGeom>
         </p:spPr>
       </p:pic>
-      <p:sp>
-        <p:nvSpPr>
-          <p:cNvPr id="3" name="TextBox 2"/>
-          <p:cNvSpPr txBox="1"/>
-          <p:nvPr/>
-        </p:nvSpPr>
-        <p:spPr>
-          <a:xfrm>
-            <a:off x="1100380" y="1301858"/>
-            <a:ext cx="803425" cy="369332"/>
-          </a:xfrm>
-          <a:prstGeom prst="rect">
-            <a:avLst/>
-          </a:prstGeom>
-          <a:noFill/>
-        </p:spPr>
-        <p:txBody>
-          <a:bodyPr wrap="none" rtlCol="0">
-            <a:spAutoFit/>
-          </a:bodyPr>
-          <a:lstStyle/>
-          <a:p>
-            <a:r>
-              <a:rPr lang="en-US" dirty="0" smtClean="0"/>
-              <a:t>Fig. 2-i</a:t>
-            </a:r>
-            <a:endParaRPr lang="en-US" dirty="0"/>
-          </a:p>
-        </p:txBody>
-      </p:sp>
     </p:spTree>
     <p:extLst>
       <p:ext uri="{BB962C8B-B14F-4D97-AF65-F5344CB8AC3E}">
-        <p14:creationId xmlns:p14="http://schemas.microsoft.com/office/powerpoint/2010/main" val="362575055"/>
+        <p14:creationId xmlns:p14="http://schemas.microsoft.com/office/powerpoint/2010/main" val="120306710"/>
       </p:ext>
     </p:extLst>
   </p:cSld>

</xml_diff>

<commit_message>
Work on ch2 figures
</commit_message>
<xml_diff>
--- a/ch2_groucho.figures/ch2_groucho.figures.pptx
+++ b/ch2_groucho.figures/ch2_groucho.figures.pptx
@@ -12,11 +12,10 @@
     <p:sldId id="260" r:id="rId6"/>
     <p:sldId id="261" r:id="rId7"/>
     <p:sldId id="264" r:id="rId8"/>
-    <p:sldId id="267" r:id="rId9"/>
-    <p:sldId id="262" r:id="rId10"/>
-    <p:sldId id="263" r:id="rId11"/>
-    <p:sldId id="265" r:id="rId12"/>
-    <p:sldId id="266" r:id="rId13"/>
+    <p:sldId id="262" r:id="rId9"/>
+    <p:sldId id="263" r:id="rId10"/>
+    <p:sldId id="265" r:id="rId11"/>
+    <p:sldId id="266" r:id="rId12"/>
   </p:sldIdLst>
   <p:sldSz cx="6858000" cy="9144000" type="letter"/>
   <p:notesSz cx="6858000" cy="9144000"/>
@@ -3247,96 +3246,6 @@
           <a:chExt cx="0" cy="0"/>
         </a:xfrm>
       </p:grpSpPr>
-      <p:pic>
-        <p:nvPicPr>
-          <p:cNvPr id="2" name="Picture 1"/>
-          <p:cNvPicPr>
-            <a:picLocks noChangeAspect="1"/>
-          </p:cNvPicPr>
-          <p:nvPr/>
-        </p:nvPicPr>
-        <p:blipFill>
-          <a:blip r:embed="rId2">
-            <a:extLst>
-              <a:ext uri="{28A0092B-C50C-407E-A947-70E740481C1C}">
-                <a14:useLocalDpi xmlns:a14="http://schemas.microsoft.com/office/drawing/2010/main" val="0"/>
-              </a:ext>
-            </a:extLst>
-          </a:blip>
-          <a:stretch>
-            <a:fillRect/>
-          </a:stretch>
-        </p:blipFill>
-        <p:spPr>
-          <a:xfrm>
-            <a:off x="0" y="1917700"/>
-            <a:ext cx="6858000" cy="5299364"/>
-          </a:xfrm>
-          <a:prstGeom prst="rect">
-            <a:avLst/>
-          </a:prstGeom>
-        </p:spPr>
-      </p:pic>
-      <p:sp>
-        <p:nvSpPr>
-          <p:cNvPr id="3" name="TextBox 2"/>
-          <p:cNvSpPr txBox="1"/>
-          <p:nvPr/>
-        </p:nvSpPr>
-        <p:spPr>
-          <a:xfrm>
-            <a:off x="1100380" y="1301858"/>
-            <a:ext cx="803425" cy="369332"/>
-          </a:xfrm>
-          <a:prstGeom prst="rect">
-            <a:avLst/>
-          </a:prstGeom>
-          <a:noFill/>
-        </p:spPr>
-        <p:txBody>
-          <a:bodyPr wrap="none" rtlCol="0">
-            <a:spAutoFit/>
-          </a:bodyPr>
-          <a:lstStyle/>
-          <a:p>
-            <a:r>
-              <a:rPr lang="en-US" dirty="0" smtClean="0"/>
-              <a:t>Fig. 2-i</a:t>
-            </a:r>
-            <a:endParaRPr lang="en-US" dirty="0"/>
-          </a:p>
-        </p:txBody>
-      </p:sp>
-    </p:spTree>
-    <p:extLst>
-      <p:ext uri="{BB962C8B-B14F-4D97-AF65-F5344CB8AC3E}">
-        <p14:creationId xmlns:p14="http://schemas.microsoft.com/office/powerpoint/2010/main" val="362575055"/>
-      </p:ext>
-    </p:extLst>
-  </p:cSld>
-  <p:clrMapOvr>
-    <a:masterClrMapping/>
-  </p:clrMapOvr>
-</p:sld>
-</file>
-
-<file path=ppt/slides/slide11.xml><?xml version="1.0" encoding="utf-8"?>
-<p:sld xmlns:a="http://schemas.openxmlformats.org/drawingml/2006/main" xmlns:r="http://schemas.openxmlformats.org/officeDocument/2006/relationships" xmlns:p="http://schemas.openxmlformats.org/presentationml/2006/main">
-  <p:cSld>
-    <p:spTree>
-      <p:nvGrpSpPr>
-        <p:cNvPr id="1" name=""/>
-        <p:cNvGrpSpPr/>
-        <p:nvPr/>
-      </p:nvGrpSpPr>
-      <p:grpSpPr>
-        <a:xfrm>
-          <a:off x="0" y="0"/>
-          <a:ext cx="0" cy="0"/>
-          <a:chOff x="0" y="0"/>
-          <a:chExt cx="0" cy="0"/>
-        </a:xfrm>
-      </p:grpSpPr>
       <p:grpSp>
         <p:nvGrpSpPr>
           <p:cNvPr id="4" name="Group 3"/>
@@ -3455,7 +3364,7 @@
 </p:sld>
 </file>
 
-<file path=ppt/slides/slide12.xml><?xml version="1.0" encoding="utf-8"?>
+<file path=ppt/slides/slide11.xml><?xml version="1.0" encoding="utf-8"?>
 <p:sld xmlns:a="http://schemas.openxmlformats.org/drawingml/2006/main" xmlns:r="http://schemas.openxmlformats.org/officeDocument/2006/relationships" xmlns:p="http://schemas.openxmlformats.org/presentationml/2006/main">
   <p:cSld>
     <p:spTree>
@@ -4574,8 +4483,97 @@
         </p:blipFill>
         <p:spPr>
           <a:xfrm>
-            <a:off x="467591" y="1548246"/>
-            <a:ext cx="6206565" cy="4795982"/>
+            <a:off x="1146875" y="1174173"/>
+            <a:ext cx="4561609" cy="3524880"/>
+          </a:xfrm>
+          <a:prstGeom prst="rect">
+            <a:avLst/>
+          </a:prstGeom>
+        </p:spPr>
+      </p:pic>
+      <p:sp>
+        <p:nvSpPr>
+          <p:cNvPr id="7" name="TextBox 6"/>
+          <p:cNvSpPr txBox="1"/>
+          <p:nvPr/>
+        </p:nvSpPr>
+        <p:spPr>
+          <a:xfrm>
+            <a:off x="619932" y="1201993"/>
+            <a:ext cx="288862" cy="307777"/>
+          </a:xfrm>
+          <a:prstGeom prst="rect">
+            <a:avLst/>
+          </a:prstGeom>
+          <a:noFill/>
+        </p:spPr>
+        <p:txBody>
+          <a:bodyPr wrap="none" rtlCol="0">
+            <a:spAutoFit/>
+          </a:bodyPr>
+          <a:lstStyle/>
+          <a:p>
+            <a:r>
+              <a:rPr lang="en-US" sz="1400" smtClean="0"/>
+              <a:t>A</a:t>
+            </a:r>
+          </a:p>
+        </p:txBody>
+      </p:sp>
+      <p:sp>
+        <p:nvSpPr>
+          <p:cNvPr id="8" name="TextBox 7"/>
+          <p:cNvSpPr txBox="1"/>
+          <p:nvPr/>
+        </p:nvSpPr>
+        <p:spPr>
+          <a:xfrm>
+            <a:off x="619932" y="4866465"/>
+            <a:ext cx="282450" cy="307777"/>
+          </a:xfrm>
+          <a:prstGeom prst="rect">
+            <a:avLst/>
+          </a:prstGeom>
+          <a:noFill/>
+        </p:spPr>
+        <p:txBody>
+          <a:bodyPr wrap="none" rtlCol="0">
+            <a:spAutoFit/>
+          </a:bodyPr>
+          <a:lstStyle/>
+          <a:p>
+            <a:r>
+              <a:rPr lang="en-US" sz="1400" dirty="0" smtClean="0"/>
+              <a:t>B</a:t>
+            </a:r>
+            <a:endParaRPr lang="en-US" sz="1400" dirty="0"/>
+          </a:p>
+        </p:txBody>
+      </p:sp>
+      <p:pic>
+        <p:nvPicPr>
+          <p:cNvPr id="9" name="Picture 8"/>
+          <p:cNvPicPr>
+            <a:picLocks noChangeAspect="1"/>
+          </p:cNvPicPr>
+          <p:nvPr/>
+        </p:nvPicPr>
+        <p:blipFill>
+          <a:blip r:embed="rId3">
+            <a:extLst>
+              <a:ext uri="{28A0092B-C50C-407E-A947-70E740481C1C}">
+                <a14:useLocalDpi xmlns:a14="http://schemas.microsoft.com/office/drawing/2010/main" val="0"/>
+              </a:ext>
+            </a:extLst>
+          </a:blip>
+          <a:stretch>
+            <a:fillRect/>
+          </a:stretch>
+        </p:blipFill>
+        <p:spPr>
+          <a:xfrm>
+            <a:off x="908794" y="5130664"/>
+            <a:ext cx="5273797" cy="3050655"/>
           </a:xfrm>
           <a:prstGeom prst="rect">
             <a:avLst/>
@@ -4596,6 +4594,96 @@
 </file>
 
 <file path=ppt/slides/slide8.xml><?xml version="1.0" encoding="utf-8"?>
+<p:sld xmlns:a="http://schemas.openxmlformats.org/drawingml/2006/main" xmlns:r="http://schemas.openxmlformats.org/officeDocument/2006/relationships" xmlns:p="http://schemas.openxmlformats.org/presentationml/2006/main">
+  <p:cSld>
+    <p:spTree>
+      <p:nvGrpSpPr>
+        <p:cNvPr id="1" name=""/>
+        <p:cNvGrpSpPr/>
+        <p:nvPr/>
+      </p:nvGrpSpPr>
+      <p:grpSpPr>
+        <a:xfrm>
+          <a:off x="0" y="0"/>
+          <a:ext cx="0" cy="0"/>
+          <a:chOff x="0" y="0"/>
+          <a:chExt cx="0" cy="0"/>
+        </a:xfrm>
+      </p:grpSpPr>
+      <p:sp>
+        <p:nvSpPr>
+          <p:cNvPr id="3" name="TextBox 2"/>
+          <p:cNvSpPr txBox="1"/>
+          <p:nvPr/>
+        </p:nvSpPr>
+        <p:spPr>
+          <a:xfrm>
+            <a:off x="1208868" y="697424"/>
+            <a:ext cx="872355" cy="369332"/>
+          </a:xfrm>
+          <a:prstGeom prst="rect">
+            <a:avLst/>
+          </a:prstGeom>
+          <a:noFill/>
+        </p:spPr>
+        <p:txBody>
+          <a:bodyPr wrap="none" rtlCol="0">
+            <a:spAutoFit/>
+          </a:bodyPr>
+          <a:lstStyle/>
+          <a:p>
+            <a:r>
+              <a:rPr lang="en-US" dirty="0" smtClean="0"/>
+              <a:t>Fig. 2-h</a:t>
+            </a:r>
+            <a:endParaRPr lang="en-US" dirty="0"/>
+          </a:p>
+        </p:txBody>
+      </p:sp>
+      <p:pic>
+        <p:nvPicPr>
+          <p:cNvPr id="4" name="Picture 3"/>
+          <p:cNvPicPr>
+            <a:picLocks noChangeAspect="1"/>
+          </p:cNvPicPr>
+          <p:nvPr/>
+        </p:nvPicPr>
+        <p:blipFill>
+          <a:blip r:embed="rId2">
+            <a:extLst>
+              <a:ext uri="{28A0092B-C50C-407E-A947-70E740481C1C}">
+                <a14:useLocalDpi xmlns:a14="http://schemas.microsoft.com/office/drawing/2010/main" val="0"/>
+              </a:ext>
+            </a:extLst>
+          </a:blip>
+          <a:stretch>
+            <a:fillRect/>
+          </a:stretch>
+        </p:blipFill>
+        <p:spPr>
+          <a:xfrm>
+            <a:off x="810491" y="1066756"/>
+            <a:ext cx="5518672" cy="6817183"/>
+          </a:xfrm>
+          <a:prstGeom prst="rect">
+            <a:avLst/>
+          </a:prstGeom>
+        </p:spPr>
+      </p:pic>
+    </p:spTree>
+    <p:extLst>
+      <p:ext uri="{BB962C8B-B14F-4D97-AF65-F5344CB8AC3E}">
+        <p14:creationId xmlns:p14="http://schemas.microsoft.com/office/powerpoint/2010/main" val="120306710"/>
+      </p:ext>
+    </p:extLst>
+  </p:cSld>
+  <p:clrMapOvr>
+    <a:masterClrMapping/>
+  </p:clrMapOvr>
+</p:sld>
+</file>
+
+<file path=ppt/slides/slide9.xml><?xml version="1.0" encoding="utf-8"?>
 <p:sld xmlns:a="http://schemas.openxmlformats.org/drawingml/2006/main" xmlns:r="http://schemas.openxmlformats.org/officeDocument/2006/relationships" xmlns:p="http://schemas.openxmlformats.org/presentationml/2006/main">
   <p:cSld>
     <p:spTree>
@@ -4634,8 +4722,8 @@
         </p:blipFill>
         <p:spPr>
           <a:xfrm>
-            <a:off x="555199" y="2130137"/>
-            <a:ext cx="5907945" cy="3417481"/>
+            <a:off x="0" y="1917700"/>
+            <a:ext cx="6858000" cy="5299364"/>
           </a:xfrm>
           <a:prstGeom prst="rect">
             <a:avLst/>
@@ -4650,8 +4738,8 @@
         </p:nvSpPr>
         <p:spPr>
           <a:xfrm>
-            <a:off x="1146875" y="557939"/>
-            <a:ext cx="854721" cy="369332"/>
+            <a:off x="1100380" y="1301858"/>
+            <a:ext cx="803425" cy="369332"/>
           </a:xfrm>
           <a:prstGeom prst="rect">
             <a:avLst/>
@@ -4666,105 +4754,16 @@
           <a:p>
             <a:r>
               <a:rPr lang="en-US" dirty="0" smtClean="0"/>
-              <a:t>Fig. 2-k</a:t>
-            </a:r>
+              <a:t>Fig. 2-i</a:t>
+            </a:r>
+            <a:endParaRPr lang="en-US" dirty="0"/>
           </a:p>
         </p:txBody>
       </p:sp>
     </p:spTree>
     <p:extLst>
       <p:ext uri="{BB962C8B-B14F-4D97-AF65-F5344CB8AC3E}">
-        <p14:creationId xmlns:p14="http://schemas.microsoft.com/office/powerpoint/2010/main" val="234576987"/>
-      </p:ext>
-    </p:extLst>
-  </p:cSld>
-  <p:clrMapOvr>
-    <a:masterClrMapping/>
-  </p:clrMapOvr>
-</p:sld>
-</file>
-
-<file path=ppt/slides/slide9.xml><?xml version="1.0" encoding="utf-8"?>
-<p:sld xmlns:a="http://schemas.openxmlformats.org/drawingml/2006/main" xmlns:r="http://schemas.openxmlformats.org/officeDocument/2006/relationships" xmlns:p="http://schemas.openxmlformats.org/presentationml/2006/main">
-  <p:cSld>
-    <p:spTree>
-      <p:nvGrpSpPr>
-        <p:cNvPr id="1" name=""/>
-        <p:cNvGrpSpPr/>
-        <p:nvPr/>
-      </p:nvGrpSpPr>
-      <p:grpSpPr>
-        <a:xfrm>
-          <a:off x="0" y="0"/>
-          <a:ext cx="0" cy="0"/>
-          <a:chOff x="0" y="0"/>
-          <a:chExt cx="0" cy="0"/>
-        </a:xfrm>
-      </p:grpSpPr>
-      <p:sp>
-        <p:nvSpPr>
-          <p:cNvPr id="3" name="TextBox 2"/>
-          <p:cNvSpPr txBox="1"/>
-          <p:nvPr/>
-        </p:nvSpPr>
-        <p:spPr>
-          <a:xfrm>
-            <a:off x="1208868" y="697424"/>
-            <a:ext cx="872355" cy="369332"/>
-          </a:xfrm>
-          <a:prstGeom prst="rect">
-            <a:avLst/>
-          </a:prstGeom>
-          <a:noFill/>
-        </p:spPr>
-        <p:txBody>
-          <a:bodyPr wrap="none" rtlCol="0">
-            <a:spAutoFit/>
-          </a:bodyPr>
-          <a:lstStyle/>
-          <a:p>
-            <a:r>
-              <a:rPr lang="en-US" dirty="0" smtClean="0"/>
-              <a:t>Fig. 2-h</a:t>
-            </a:r>
-            <a:endParaRPr lang="en-US" dirty="0"/>
-          </a:p>
-        </p:txBody>
-      </p:sp>
-      <p:pic>
-        <p:nvPicPr>
-          <p:cNvPr id="4" name="Picture 3"/>
-          <p:cNvPicPr>
-            <a:picLocks noChangeAspect="1"/>
-          </p:cNvPicPr>
-          <p:nvPr/>
-        </p:nvPicPr>
-        <p:blipFill>
-          <a:blip r:embed="rId2">
-            <a:extLst>
-              <a:ext uri="{28A0092B-C50C-407E-A947-70E740481C1C}">
-                <a14:useLocalDpi xmlns:a14="http://schemas.microsoft.com/office/drawing/2010/main" val="0"/>
-              </a:ext>
-            </a:extLst>
-          </a:blip>
-          <a:stretch>
-            <a:fillRect/>
-          </a:stretch>
-        </p:blipFill>
-        <p:spPr>
-          <a:xfrm>
-            <a:off x="810491" y="1066756"/>
-            <a:ext cx="5518672" cy="6817183"/>
-          </a:xfrm>
-          <a:prstGeom prst="rect">
-            <a:avLst/>
-          </a:prstGeom>
-        </p:spPr>
-      </p:pic>
-    </p:spTree>
-    <p:extLst>
-      <p:ext uri="{BB962C8B-B14F-4D97-AF65-F5344CB8AC3E}">
-        <p14:creationId xmlns:p14="http://schemas.microsoft.com/office/powerpoint/2010/main" val="120306710"/>
+        <p14:creationId xmlns:p14="http://schemas.microsoft.com/office/powerpoint/2010/main" val="362575055"/>
       </p:ext>
     </p:extLst>
   </p:cSld>

</xml_diff>

<commit_message>
Work on ch 2 results
</commit_message>
<xml_diff>
--- a/ch2_groucho.figures/ch2_groucho.figures.pptx
+++ b/ch2_groucho.figures/ch2_groucho.figures.pptx
@@ -16,6 +16,7 @@
     <p:sldId id="263" r:id="rId10"/>
     <p:sldId id="265" r:id="rId11"/>
     <p:sldId id="266" r:id="rId12"/>
+    <p:sldId id="267" r:id="rId13"/>
   </p:sldIdLst>
   <p:sldSz cx="6858000" cy="9144000" type="letter"/>
   <p:notesSz cx="6858000" cy="9144000"/>
@@ -3454,6 +3455,96 @@
 </p:sld>
 </file>
 
+<file path=ppt/slides/slide12.xml><?xml version="1.0" encoding="utf-8"?>
+<p:sld xmlns:a="http://schemas.openxmlformats.org/drawingml/2006/main" xmlns:r="http://schemas.openxmlformats.org/officeDocument/2006/relationships" xmlns:p="http://schemas.openxmlformats.org/presentationml/2006/main">
+  <p:cSld>
+    <p:spTree>
+      <p:nvGrpSpPr>
+        <p:cNvPr id="1" name=""/>
+        <p:cNvGrpSpPr/>
+        <p:nvPr/>
+      </p:nvGrpSpPr>
+      <p:grpSpPr>
+        <a:xfrm>
+          <a:off x="0" y="0"/>
+          <a:ext cx="0" cy="0"/>
+          <a:chOff x="0" y="0"/>
+          <a:chExt cx="0" cy="0"/>
+        </a:xfrm>
+      </p:grpSpPr>
+      <p:pic>
+        <p:nvPicPr>
+          <p:cNvPr id="2" name="Picture 1" descr="Screen Shot 2015-02-24 at 8.55.51 PM.png"/>
+          <p:cNvPicPr>
+            <a:picLocks noChangeAspect="1"/>
+          </p:cNvPicPr>
+          <p:nvPr/>
+        </p:nvPicPr>
+        <p:blipFill>
+          <a:blip r:embed="rId2">
+            <a:extLst>
+              <a:ext uri="{28A0092B-C50C-407E-A947-70E740481C1C}">
+                <a14:useLocalDpi xmlns:a14="http://schemas.microsoft.com/office/drawing/2010/main" val="0"/>
+              </a:ext>
+            </a:extLst>
+          </a:blip>
+          <a:stretch>
+            <a:fillRect/>
+          </a:stretch>
+        </p:blipFill>
+        <p:spPr>
+          <a:xfrm>
+            <a:off x="1857200" y="1383844"/>
+            <a:ext cx="3284531" cy="1228190"/>
+          </a:xfrm>
+          <a:prstGeom prst="rect">
+            <a:avLst/>
+          </a:prstGeom>
+        </p:spPr>
+      </p:pic>
+      <p:sp>
+        <p:nvSpPr>
+          <p:cNvPr id="3" name="TextBox 2"/>
+          <p:cNvSpPr txBox="1"/>
+          <p:nvPr/>
+        </p:nvSpPr>
+        <p:spPr>
+          <a:xfrm>
+            <a:off x="666427" y="700051"/>
+            <a:ext cx="854721" cy="369332"/>
+          </a:xfrm>
+          <a:prstGeom prst="rect">
+            <a:avLst/>
+          </a:prstGeom>
+          <a:noFill/>
+        </p:spPr>
+        <p:txBody>
+          <a:bodyPr wrap="none" rtlCol="0">
+            <a:spAutoFit/>
+          </a:bodyPr>
+          <a:lstStyle/>
+          <a:p>
+            <a:r>
+              <a:rPr lang="en-US" dirty="0" smtClean="0"/>
+              <a:t>Fig. 2-k</a:t>
+            </a:r>
+            <a:endParaRPr lang="en-US" dirty="0"/>
+          </a:p>
+        </p:txBody>
+      </p:sp>
+    </p:spTree>
+    <p:extLst>
+      <p:ext uri="{BB962C8B-B14F-4D97-AF65-F5344CB8AC3E}">
+        <p14:creationId xmlns:p14="http://schemas.microsoft.com/office/powerpoint/2010/main" val="221713886"/>
+      </p:ext>
+    </p:extLst>
+  </p:cSld>
+  <p:clrMapOvr>
+    <a:masterClrMapping/>
+  </p:clrMapOvr>
+</p:sld>
+</file>
+
 <file path=ppt/slides/slide2.xml><?xml version="1.0" encoding="utf-8"?>
 <p:sld xmlns:a="http://schemas.openxmlformats.org/drawingml/2006/main" xmlns:r="http://schemas.openxmlformats.org/officeDocument/2006/relationships" xmlns:p="http://schemas.openxmlformats.org/presentationml/2006/main">
   <p:cSld>

</xml_diff>

<commit_message>
Update of ch2//chip-seq draft
</commit_message>
<xml_diff>
--- a/ch2_groucho.figures/ch2_groucho.figures.pptx
+++ b/ch2_groucho.figures/ch2_groucho.figures.pptx
@@ -9,14 +9,14 @@
     <p:sldId id="257" r:id="rId3"/>
     <p:sldId id="258" r:id="rId4"/>
     <p:sldId id="259" r:id="rId5"/>
-    <p:sldId id="260" r:id="rId6"/>
-    <p:sldId id="261" r:id="rId7"/>
-    <p:sldId id="264" r:id="rId8"/>
-    <p:sldId id="262" r:id="rId9"/>
-    <p:sldId id="263" r:id="rId10"/>
-    <p:sldId id="265" r:id="rId11"/>
-    <p:sldId id="266" r:id="rId12"/>
-    <p:sldId id="267" r:id="rId13"/>
+    <p:sldId id="262" r:id="rId6"/>
+    <p:sldId id="260" r:id="rId7"/>
+    <p:sldId id="261" r:id="rId8"/>
+    <p:sldId id="264" r:id="rId9"/>
+    <p:sldId id="265" r:id="rId10"/>
+    <p:sldId id="266" r:id="rId11"/>
+    <p:sldId id="267" r:id="rId12"/>
+    <p:sldId id="263" r:id="rId13"/>
   </p:sldIdLst>
   <p:sldSz cx="6858000" cy="9144000" type="letter"/>
   <p:notesSz cx="6858000" cy="9144000"/>
@@ -3247,141 +3247,6 @@
           <a:chExt cx="0" cy="0"/>
         </a:xfrm>
       </p:grpSpPr>
-      <p:grpSp>
-        <p:nvGrpSpPr>
-          <p:cNvPr id="4" name="Group 3"/>
-          <p:cNvGrpSpPr/>
-          <p:nvPr/>
-        </p:nvGrpSpPr>
-        <p:grpSpPr>
-          <a:xfrm>
-            <a:off x="1677692" y="1069383"/>
-            <a:ext cx="3502617" cy="7005235"/>
-            <a:chOff x="1677692" y="759415"/>
-            <a:chExt cx="3502617" cy="7005235"/>
-          </a:xfrm>
-        </p:grpSpPr>
-        <p:pic>
-          <p:nvPicPr>
-            <p:cNvPr id="2" name="Picture 1"/>
-            <p:cNvPicPr>
-              <a:picLocks noChangeAspect="1"/>
-            </p:cNvPicPr>
-            <p:nvPr/>
-          </p:nvPicPr>
-          <p:blipFill>
-            <a:blip r:embed="rId2">
-              <a:extLst>
-                <a:ext uri="{28A0092B-C50C-407E-A947-70E740481C1C}">
-                  <a14:useLocalDpi xmlns:a14="http://schemas.microsoft.com/office/drawing/2010/main" val="0"/>
-                </a:ext>
-              </a:extLst>
-            </a:blip>
-            <a:stretch>
-              <a:fillRect/>
-            </a:stretch>
-          </p:blipFill>
-          <p:spPr>
-            <a:xfrm>
-              <a:off x="1677692" y="759415"/>
-              <a:ext cx="3502617" cy="3502617"/>
-            </a:xfrm>
-            <a:prstGeom prst="rect">
-              <a:avLst/>
-            </a:prstGeom>
-          </p:spPr>
-        </p:pic>
-        <p:pic>
-          <p:nvPicPr>
-            <p:cNvPr id="3" name="Picture 2"/>
-            <p:cNvPicPr>
-              <a:picLocks noChangeAspect="1"/>
-            </p:cNvPicPr>
-            <p:nvPr/>
-          </p:nvPicPr>
-          <p:blipFill>
-            <a:blip r:embed="rId3">
-              <a:extLst>
-                <a:ext uri="{28A0092B-C50C-407E-A947-70E740481C1C}">
-                  <a14:useLocalDpi xmlns:a14="http://schemas.microsoft.com/office/drawing/2010/main" val="0"/>
-                </a:ext>
-              </a:extLst>
-            </a:blip>
-            <a:stretch>
-              <a:fillRect/>
-            </a:stretch>
-          </p:blipFill>
-          <p:spPr>
-            <a:xfrm>
-              <a:off x="1677692" y="4262033"/>
-              <a:ext cx="3502617" cy="3502617"/>
-            </a:xfrm>
-            <a:prstGeom prst="rect">
-              <a:avLst/>
-            </a:prstGeom>
-          </p:spPr>
-        </p:pic>
-      </p:grpSp>
-      <p:sp>
-        <p:nvSpPr>
-          <p:cNvPr id="5" name="TextBox 4"/>
-          <p:cNvSpPr txBox="1"/>
-          <p:nvPr/>
-        </p:nvSpPr>
-        <p:spPr>
-          <a:xfrm>
-            <a:off x="666427" y="700051"/>
-            <a:ext cx="805029" cy="369332"/>
-          </a:xfrm>
-          <a:prstGeom prst="rect">
-            <a:avLst/>
-          </a:prstGeom>
-          <a:noFill/>
-        </p:spPr>
-        <p:txBody>
-          <a:bodyPr wrap="none" rtlCol="0">
-            <a:spAutoFit/>
-          </a:bodyPr>
-          <a:lstStyle/>
-          <a:p>
-            <a:r>
-              <a:rPr lang="en-US" dirty="0" smtClean="0"/>
-              <a:t>Fig. 2-j</a:t>
-            </a:r>
-            <a:endParaRPr lang="en-US" dirty="0"/>
-          </a:p>
-        </p:txBody>
-      </p:sp>
-    </p:spTree>
-    <p:extLst>
-      <p:ext uri="{BB962C8B-B14F-4D97-AF65-F5344CB8AC3E}">
-        <p14:creationId xmlns:p14="http://schemas.microsoft.com/office/powerpoint/2010/main" val="1487053959"/>
-      </p:ext>
-    </p:extLst>
-  </p:cSld>
-  <p:clrMapOvr>
-    <a:masterClrMapping/>
-  </p:clrMapOvr>
-</p:sld>
-</file>
-
-<file path=ppt/slides/slide11.xml><?xml version="1.0" encoding="utf-8"?>
-<p:sld xmlns:a="http://schemas.openxmlformats.org/drawingml/2006/main" xmlns:r="http://schemas.openxmlformats.org/officeDocument/2006/relationships" xmlns:p="http://schemas.openxmlformats.org/presentationml/2006/main">
-  <p:cSld>
-    <p:spTree>
-      <p:nvGrpSpPr>
-        <p:cNvPr id="1" name=""/>
-        <p:cNvGrpSpPr/>
-        <p:nvPr/>
-      </p:nvGrpSpPr>
-      <p:grpSpPr>
-        <a:xfrm>
-          <a:off x="0" y="0"/>
-          <a:ext cx="0" cy="0"/>
-          <a:chOff x="0" y="0"/>
-          <a:chExt cx="0" cy="0"/>
-        </a:xfrm>
-      </p:grpSpPr>
       <p:pic>
         <p:nvPicPr>
           <p:cNvPr id="3" name="Picture 2"/>
@@ -3455,7 +3320,7 @@
 </p:sld>
 </file>
 
-<file path=ppt/slides/slide12.xml><?xml version="1.0" encoding="utf-8"?>
+<file path=ppt/slides/slide11.xml><?xml version="1.0" encoding="utf-8"?>
 <p:sld xmlns:a="http://schemas.openxmlformats.org/drawingml/2006/main" xmlns:r="http://schemas.openxmlformats.org/officeDocument/2006/relationships" xmlns:p="http://schemas.openxmlformats.org/presentationml/2006/main">
   <p:cSld>
     <p:spTree>
@@ -3536,6 +3401,96 @@
     <p:extLst>
       <p:ext uri="{BB962C8B-B14F-4D97-AF65-F5344CB8AC3E}">
         <p14:creationId xmlns:p14="http://schemas.microsoft.com/office/powerpoint/2010/main" val="221713886"/>
+      </p:ext>
+    </p:extLst>
+  </p:cSld>
+  <p:clrMapOvr>
+    <a:masterClrMapping/>
+  </p:clrMapOvr>
+</p:sld>
+</file>
+
+<file path=ppt/slides/slide12.xml><?xml version="1.0" encoding="utf-8"?>
+<p:sld xmlns:a="http://schemas.openxmlformats.org/drawingml/2006/main" xmlns:r="http://schemas.openxmlformats.org/officeDocument/2006/relationships" xmlns:p="http://schemas.openxmlformats.org/presentationml/2006/main">
+  <p:cSld>
+    <p:spTree>
+      <p:nvGrpSpPr>
+        <p:cNvPr id="1" name=""/>
+        <p:cNvGrpSpPr/>
+        <p:nvPr/>
+      </p:nvGrpSpPr>
+      <p:grpSpPr>
+        <a:xfrm>
+          <a:off x="0" y="0"/>
+          <a:ext cx="0" cy="0"/>
+          <a:chOff x="0" y="0"/>
+          <a:chExt cx="0" cy="0"/>
+        </a:xfrm>
+      </p:grpSpPr>
+      <p:pic>
+        <p:nvPicPr>
+          <p:cNvPr id="2" name="Picture 1"/>
+          <p:cNvPicPr>
+            <a:picLocks noChangeAspect="1"/>
+          </p:cNvPicPr>
+          <p:nvPr/>
+        </p:nvPicPr>
+        <p:blipFill>
+          <a:blip r:embed="rId2">
+            <a:extLst>
+              <a:ext uri="{28A0092B-C50C-407E-A947-70E740481C1C}">
+                <a14:useLocalDpi xmlns:a14="http://schemas.microsoft.com/office/drawing/2010/main" val="0"/>
+              </a:ext>
+            </a:extLst>
+          </a:blip>
+          <a:stretch>
+            <a:fillRect/>
+          </a:stretch>
+        </p:blipFill>
+        <p:spPr>
+          <a:xfrm>
+            <a:off x="0" y="1917700"/>
+            <a:ext cx="6858000" cy="5299364"/>
+          </a:xfrm>
+          <a:prstGeom prst="rect">
+            <a:avLst/>
+          </a:prstGeom>
+        </p:spPr>
+      </p:pic>
+      <p:sp>
+        <p:nvSpPr>
+          <p:cNvPr id="3" name="TextBox 2"/>
+          <p:cNvSpPr txBox="1"/>
+          <p:nvPr/>
+        </p:nvSpPr>
+        <p:spPr>
+          <a:xfrm>
+            <a:off x="1100380" y="1301858"/>
+            <a:ext cx="803425" cy="369332"/>
+          </a:xfrm>
+          <a:prstGeom prst="rect">
+            <a:avLst/>
+          </a:prstGeom>
+          <a:noFill/>
+        </p:spPr>
+        <p:txBody>
+          <a:bodyPr wrap="none" rtlCol="0">
+            <a:spAutoFit/>
+          </a:bodyPr>
+          <a:lstStyle/>
+          <a:p>
+            <a:r>
+              <a:rPr lang="en-US" dirty="0" smtClean="0"/>
+              <a:t>Fig. 2-i</a:t>
+            </a:r>
+            <a:endParaRPr lang="en-US" dirty="0"/>
+          </a:p>
+        </p:txBody>
+      </p:sp>
+    </p:spTree>
+    <p:extLst>
+      <p:ext uri="{BB962C8B-B14F-4D97-AF65-F5344CB8AC3E}">
+        <p14:creationId xmlns:p14="http://schemas.microsoft.com/office/powerpoint/2010/main" val="362575055"/>
       </p:ext>
     </p:extLst>
   </p:cSld>
@@ -3906,9 +3861,98 @@
           </a:prstGeom>
         </p:spPr>
       </p:pic>
+      <p:sp>
+        <p:nvSpPr>
+          <p:cNvPr id="4" name="TextBox 3"/>
+          <p:cNvSpPr txBox="1"/>
+          <p:nvPr/>
+        </p:nvSpPr>
+        <p:spPr>
+          <a:xfrm>
+            <a:off x="619932" y="604434"/>
+            <a:ext cx="848309" cy="369332"/>
+          </a:xfrm>
+          <a:prstGeom prst="rect">
+            <a:avLst/>
+          </a:prstGeom>
+          <a:noFill/>
+        </p:spPr>
+        <p:txBody>
+          <a:bodyPr wrap="none" rtlCol="0">
+            <a:spAutoFit/>
+          </a:bodyPr>
+          <a:lstStyle/>
+          <a:p>
+            <a:r>
+              <a:rPr lang="en-US" dirty="0" smtClean="0"/>
+              <a:t>Fig. 2-c</a:t>
+            </a:r>
+            <a:endParaRPr lang="en-US" dirty="0"/>
+          </a:p>
+        </p:txBody>
+      </p:sp>
+      <p:sp>
+        <p:nvSpPr>
+          <p:cNvPr id="5" name="TextBox 4"/>
+          <p:cNvSpPr txBox="1"/>
+          <p:nvPr/>
+        </p:nvSpPr>
+        <p:spPr>
+          <a:xfrm>
+            <a:off x="619932" y="1201993"/>
+            <a:ext cx="288862" cy="307777"/>
+          </a:xfrm>
+          <a:prstGeom prst="rect">
+            <a:avLst/>
+          </a:prstGeom>
+          <a:noFill/>
+        </p:spPr>
+        <p:txBody>
+          <a:bodyPr wrap="none" rtlCol="0">
+            <a:spAutoFit/>
+          </a:bodyPr>
+          <a:lstStyle/>
+          <a:p>
+            <a:r>
+              <a:rPr lang="en-US" sz="1400" smtClean="0"/>
+              <a:t>A</a:t>
+            </a:r>
+          </a:p>
+        </p:txBody>
+      </p:sp>
+      <p:sp>
+        <p:nvSpPr>
+          <p:cNvPr id="6" name="TextBox 5"/>
+          <p:cNvSpPr txBox="1"/>
+          <p:nvPr/>
+        </p:nvSpPr>
+        <p:spPr>
+          <a:xfrm>
+            <a:off x="619932" y="4866465"/>
+            <a:ext cx="282450" cy="307777"/>
+          </a:xfrm>
+          <a:prstGeom prst="rect">
+            <a:avLst/>
+          </a:prstGeom>
+          <a:noFill/>
+        </p:spPr>
+        <p:txBody>
+          <a:bodyPr wrap="none" rtlCol="0">
+            <a:spAutoFit/>
+          </a:bodyPr>
+          <a:lstStyle/>
+          <a:p>
+            <a:r>
+              <a:rPr lang="en-US" sz="1400" dirty="0" smtClean="0"/>
+              <a:t>B</a:t>
+            </a:r>
+            <a:endParaRPr lang="en-US" sz="1400" dirty="0"/>
+          </a:p>
+        </p:txBody>
+      </p:sp>
       <p:pic>
         <p:nvPicPr>
-          <p:cNvPr id="3" name="Picture 2"/>
+          <p:cNvPr id="7" name="Picture 6"/>
           <p:cNvPicPr>
             <a:picLocks noChangeAspect="1"/>
           </p:cNvPicPr>
@@ -3928,8 +3972,8 @@
         </p:blipFill>
         <p:spPr>
           <a:xfrm>
-            <a:off x="1086818" y="4544878"/>
-            <a:ext cx="4599122" cy="4599122"/>
+            <a:off x="1028099" y="4564251"/>
+            <a:ext cx="4579749" cy="4579749"/>
           </a:xfrm>
           <a:prstGeom prst="rect">
             <a:avLst/>
@@ -3938,90 +3982,97 @@
       </p:pic>
       <p:sp>
         <p:nvSpPr>
-          <p:cNvPr id="4" name="TextBox 3"/>
-          <p:cNvSpPr txBox="1"/>
+          <p:cNvPr id="8" name="Rectangle 7"/>
+          <p:cNvSpPr/>
           <p:nvPr/>
         </p:nvSpPr>
         <p:spPr>
           <a:xfrm>
-            <a:off x="619932" y="604434"/>
-            <a:ext cx="848309" cy="369332"/>
-          </a:xfrm>
-          <a:prstGeom prst="rect">
-            <a:avLst/>
-          </a:prstGeom>
-          <a:noFill/>
-        </p:spPr>
-        <p:txBody>
-          <a:bodyPr wrap="none" rtlCol="0">
-            <a:spAutoFit/>
-          </a:bodyPr>
-          <a:lstStyle/>
-          <a:p>
-            <a:r>
-              <a:rPr lang="en-US" dirty="0" smtClean="0"/>
-              <a:t>Fig. 2-c</a:t>
-            </a:r>
-            <a:endParaRPr lang="en-US" dirty="0"/>
-          </a:p>
-        </p:txBody>
-      </p:sp>
-      <p:sp>
-        <p:nvSpPr>
-          <p:cNvPr id="5" name="TextBox 4"/>
-          <p:cNvSpPr txBox="1"/>
+            <a:off x="4951708" y="8547315"/>
+            <a:ext cx="656140" cy="356461"/>
+          </a:xfrm>
+          <a:prstGeom prst="rect">
+            <a:avLst/>
+          </a:prstGeom>
+          <a:solidFill>
+            <a:schemeClr val="bg1"/>
+          </a:solidFill>
+          <a:ln>
+            <a:solidFill>
+              <a:schemeClr val="bg1"/>
+            </a:solidFill>
+          </a:ln>
+        </p:spPr>
+        <p:style>
+          <a:lnRef idx="2">
+            <a:schemeClr val="accent1">
+              <a:shade val="50000"/>
+            </a:schemeClr>
+          </a:lnRef>
+          <a:fillRef idx="1">
+            <a:schemeClr val="accent1"/>
+          </a:fillRef>
+          <a:effectRef idx="0">
+            <a:schemeClr val="accent1"/>
+          </a:effectRef>
+          <a:fontRef idx="minor">
+            <a:schemeClr val="lt1"/>
+          </a:fontRef>
+        </p:style>
+        <p:txBody>
+          <a:bodyPr rtlCol="0" anchor="ctr"/>
+          <a:lstStyle/>
+          <a:p>
+            <a:pPr algn="ctr"/>
+            <a:endParaRPr lang="en-US"/>
+          </a:p>
+        </p:txBody>
+      </p:sp>
+      <p:sp>
+        <p:nvSpPr>
+          <p:cNvPr id="9" name="Rectangle 8"/>
+          <p:cNvSpPr/>
           <p:nvPr/>
         </p:nvSpPr>
         <p:spPr>
           <a:xfrm>
-            <a:off x="619932" y="1201993"/>
-            <a:ext cx="288862" cy="307777"/>
-          </a:xfrm>
-          <a:prstGeom prst="rect">
-            <a:avLst/>
-          </a:prstGeom>
-          <a:noFill/>
-        </p:spPr>
-        <p:txBody>
-          <a:bodyPr wrap="none" rtlCol="0">
-            <a:spAutoFit/>
-          </a:bodyPr>
-          <a:lstStyle/>
-          <a:p>
-            <a:r>
-              <a:rPr lang="en-US" sz="1400" smtClean="0"/>
-              <a:t>A</a:t>
-            </a:r>
-          </a:p>
-        </p:txBody>
-      </p:sp>
-      <p:sp>
-        <p:nvSpPr>
-          <p:cNvPr id="6" name="TextBox 5"/>
-          <p:cNvSpPr txBox="1"/>
-          <p:nvPr/>
-        </p:nvSpPr>
-        <p:spPr>
-          <a:xfrm>
-            <a:off x="619932" y="4866465"/>
-            <a:ext cx="282450" cy="307777"/>
-          </a:xfrm>
-          <a:prstGeom prst="rect">
-            <a:avLst/>
-          </a:prstGeom>
-          <a:noFill/>
-        </p:spPr>
-        <p:txBody>
-          <a:bodyPr wrap="none" rtlCol="0">
-            <a:spAutoFit/>
-          </a:bodyPr>
-          <a:lstStyle/>
-          <a:p>
-            <a:r>
-              <a:rPr lang="en-US" sz="1400" dirty="0" smtClean="0"/>
-              <a:t>B</a:t>
-            </a:r>
-            <a:endParaRPr lang="en-US" sz="1400" dirty="0"/>
+            <a:off x="4971080" y="4386020"/>
+            <a:ext cx="656140" cy="356461"/>
+          </a:xfrm>
+          <a:prstGeom prst="rect">
+            <a:avLst/>
+          </a:prstGeom>
+          <a:solidFill>
+            <a:schemeClr val="bg1"/>
+          </a:solidFill>
+          <a:ln>
+            <a:solidFill>
+              <a:schemeClr val="bg1"/>
+            </a:solidFill>
+          </a:ln>
+        </p:spPr>
+        <p:style>
+          <a:lnRef idx="2">
+            <a:schemeClr val="accent1">
+              <a:shade val="50000"/>
+            </a:schemeClr>
+          </a:lnRef>
+          <a:fillRef idx="1">
+            <a:schemeClr val="accent1"/>
+          </a:fillRef>
+          <a:effectRef idx="0">
+            <a:schemeClr val="accent1"/>
+          </a:effectRef>
+          <a:fontRef idx="minor">
+            <a:schemeClr val="lt1"/>
+          </a:fontRef>
+        </p:style>
+        <p:txBody>
+          <a:bodyPr rtlCol="0" anchor="ctr"/>
+          <a:lstStyle/>
+          <a:p>
+            <a:pPr algn="ctr"/>
+            <a:endParaRPr lang="en-US"/>
           </a:p>
         </p:txBody>
       </p:sp>
@@ -4077,8 +4128,8 @@
         </p:blipFill>
         <p:spPr>
           <a:xfrm>
-            <a:off x="228600" y="1371600"/>
-            <a:ext cx="6400800" cy="6400800"/>
+            <a:off x="1201049" y="1347849"/>
+            <a:ext cx="4509655" cy="4509655"/>
           </a:xfrm>
           <a:prstGeom prst="rect">
             <a:avLst/>
@@ -4111,6 +4162,96 @@
               <a:rPr lang="en-US" dirty="0" smtClean="0"/>
               <a:t>Fig. 2-d</a:t>
             </a:r>
+          </a:p>
+        </p:txBody>
+      </p:sp>
+      <p:pic>
+        <p:nvPicPr>
+          <p:cNvPr id="4" name="Picture 3" descr="analysis_10_binding_per_gene_histogram.png"/>
+          <p:cNvPicPr>
+            <a:picLocks noChangeAspect="1"/>
+          </p:cNvPicPr>
+          <p:nvPr/>
+        </p:nvPicPr>
+        <p:blipFill>
+          <a:blip r:embed="rId3">
+            <a:extLst>
+              <a:ext uri="{28A0092B-C50C-407E-A947-70E740481C1C}">
+                <a14:useLocalDpi xmlns:a14="http://schemas.microsoft.com/office/drawing/2010/main" val="0"/>
+              </a:ext>
+            </a:extLst>
+          </a:blip>
+          <a:stretch>
+            <a:fillRect/>
+          </a:stretch>
+        </p:blipFill>
+        <p:spPr>
+          <a:xfrm>
+            <a:off x="836907" y="5857504"/>
+            <a:ext cx="5543425" cy="2645228"/>
+          </a:xfrm>
+          <a:prstGeom prst="rect">
+            <a:avLst/>
+          </a:prstGeom>
+        </p:spPr>
+      </p:pic>
+      <p:sp>
+        <p:nvSpPr>
+          <p:cNvPr id="5" name="TextBox 4"/>
+          <p:cNvSpPr txBox="1"/>
+          <p:nvPr/>
+        </p:nvSpPr>
+        <p:spPr>
+          <a:xfrm>
+            <a:off x="692476" y="1534002"/>
+            <a:ext cx="288862" cy="307777"/>
+          </a:xfrm>
+          <a:prstGeom prst="rect">
+            <a:avLst/>
+          </a:prstGeom>
+          <a:noFill/>
+        </p:spPr>
+        <p:txBody>
+          <a:bodyPr wrap="none" rtlCol="0">
+            <a:spAutoFit/>
+          </a:bodyPr>
+          <a:lstStyle/>
+          <a:p>
+            <a:r>
+              <a:rPr lang="en-US" sz="1400" dirty="0" smtClean="0"/>
+              <a:t>A</a:t>
+            </a:r>
+            <a:endParaRPr lang="en-US" sz="1400" dirty="0"/>
+          </a:p>
+        </p:txBody>
+      </p:sp>
+      <p:sp>
+        <p:nvSpPr>
+          <p:cNvPr id="6" name="TextBox 5"/>
+          <p:cNvSpPr txBox="1"/>
+          <p:nvPr/>
+        </p:nvSpPr>
+        <p:spPr>
+          <a:xfrm>
+            <a:off x="692476" y="5919698"/>
+            <a:ext cx="282450" cy="307777"/>
+          </a:xfrm>
+          <a:prstGeom prst="rect">
+            <a:avLst/>
+          </a:prstGeom>
+          <a:noFill/>
+        </p:spPr>
+        <p:txBody>
+          <a:bodyPr wrap="none" rtlCol="0">
+            <a:spAutoFit/>
+          </a:bodyPr>
+          <a:lstStyle/>
+          <a:p>
+            <a:r>
+              <a:rPr lang="en-US" sz="1400" dirty="0"/>
+              <a:t>B</a:t>
+            </a:r>
+            <a:endParaRPr lang="en-US" sz="1400" dirty="0"/>
           </a:p>
         </p:txBody>
       </p:sp>
@@ -4128,6 +4269,96 @@
 </file>
 
 <file path=ppt/slides/slide5.xml><?xml version="1.0" encoding="utf-8"?>
+<p:sld xmlns:a="http://schemas.openxmlformats.org/drawingml/2006/main" xmlns:r="http://schemas.openxmlformats.org/officeDocument/2006/relationships" xmlns:p="http://schemas.openxmlformats.org/presentationml/2006/main">
+  <p:cSld>
+    <p:spTree>
+      <p:nvGrpSpPr>
+        <p:cNvPr id="1" name=""/>
+        <p:cNvGrpSpPr/>
+        <p:nvPr/>
+      </p:nvGrpSpPr>
+      <p:grpSpPr>
+        <a:xfrm>
+          <a:off x="0" y="0"/>
+          <a:ext cx="0" cy="0"/>
+          <a:chOff x="0" y="0"/>
+          <a:chExt cx="0" cy="0"/>
+        </a:xfrm>
+      </p:grpSpPr>
+      <p:sp>
+        <p:nvSpPr>
+          <p:cNvPr id="3" name="TextBox 2"/>
+          <p:cNvSpPr txBox="1"/>
+          <p:nvPr/>
+        </p:nvSpPr>
+        <p:spPr>
+          <a:xfrm>
+            <a:off x="1208868" y="697424"/>
+            <a:ext cx="872355" cy="369332"/>
+          </a:xfrm>
+          <a:prstGeom prst="rect">
+            <a:avLst/>
+          </a:prstGeom>
+          <a:noFill/>
+        </p:spPr>
+        <p:txBody>
+          <a:bodyPr wrap="none" rtlCol="0">
+            <a:spAutoFit/>
+          </a:bodyPr>
+          <a:lstStyle/>
+          <a:p>
+            <a:r>
+              <a:rPr lang="en-US" dirty="0" smtClean="0"/>
+              <a:t>Fig. 2-h</a:t>
+            </a:r>
+            <a:endParaRPr lang="en-US" dirty="0"/>
+          </a:p>
+        </p:txBody>
+      </p:sp>
+      <p:pic>
+        <p:nvPicPr>
+          <p:cNvPr id="4" name="Picture 3"/>
+          <p:cNvPicPr>
+            <a:picLocks noChangeAspect="1"/>
+          </p:cNvPicPr>
+          <p:nvPr/>
+        </p:nvPicPr>
+        <p:blipFill>
+          <a:blip r:embed="rId2">
+            <a:extLst>
+              <a:ext uri="{28A0092B-C50C-407E-A947-70E740481C1C}">
+                <a14:useLocalDpi xmlns:a14="http://schemas.microsoft.com/office/drawing/2010/main" val="0"/>
+              </a:ext>
+            </a:extLst>
+          </a:blip>
+          <a:stretch>
+            <a:fillRect/>
+          </a:stretch>
+        </p:blipFill>
+        <p:spPr>
+          <a:xfrm>
+            <a:off x="810491" y="1066756"/>
+            <a:ext cx="5518672" cy="6817183"/>
+          </a:xfrm>
+          <a:prstGeom prst="rect">
+            <a:avLst/>
+          </a:prstGeom>
+        </p:spPr>
+      </p:pic>
+    </p:spTree>
+    <p:extLst>
+      <p:ext uri="{BB962C8B-B14F-4D97-AF65-F5344CB8AC3E}">
+        <p14:creationId xmlns:p14="http://schemas.microsoft.com/office/powerpoint/2010/main" val="120306710"/>
+      </p:ext>
+    </p:extLst>
+  </p:cSld>
+  <p:clrMapOvr>
+    <a:masterClrMapping/>
+  </p:clrMapOvr>
+</p:sld>
+</file>
+
+<file path=ppt/slides/slide6.xml><?xml version="1.0" encoding="utf-8"?>
 <p:sld xmlns:a="http://schemas.openxmlformats.org/drawingml/2006/main" xmlns:r="http://schemas.openxmlformats.org/officeDocument/2006/relationships" xmlns:p="http://schemas.openxmlformats.org/presentationml/2006/main">
   <p:cSld>
     <p:spTree>
@@ -4368,7 +4599,7 @@
 </p:sld>
 </file>
 
-<file path=ppt/slides/slide6.xml><?xml version="1.0" encoding="utf-8"?>
+<file path=ppt/slides/slide7.xml><?xml version="1.0" encoding="utf-8"?>
 <p:sld xmlns:a="http://schemas.openxmlformats.org/drawingml/2006/main" xmlns:r="http://schemas.openxmlformats.org/officeDocument/2006/relationships" xmlns:p="http://schemas.openxmlformats.org/presentationml/2006/main">
   <p:cSld>
     <p:spTree>
@@ -4506,7 +4737,7 @@
 </p:sld>
 </file>
 
-<file path=ppt/slides/slide7.xml><?xml version="1.0" encoding="utf-8"?>
+<file path=ppt/slides/slide8.xml><?xml version="1.0" encoding="utf-8"?>
 <p:sld xmlns:a="http://schemas.openxmlformats.org/drawingml/2006/main" xmlns:r="http://schemas.openxmlformats.org/officeDocument/2006/relationships" xmlns:p="http://schemas.openxmlformats.org/presentationml/2006/main">
   <p:cSld>
     <p:spTree>
@@ -4643,7 +4874,7 @@
       </p:sp>
       <p:pic>
         <p:nvPicPr>
-          <p:cNvPr id="9" name="Picture 8"/>
+          <p:cNvPr id="10" name="Picture 9"/>
           <p:cNvPicPr>
             <a:picLocks noChangeAspect="1"/>
           </p:cNvPicPr>
@@ -4663,8 +4894,8 @@
         </p:blipFill>
         <p:spPr>
           <a:xfrm>
-            <a:off x="908794" y="5130664"/>
-            <a:ext cx="5273797" cy="3050655"/>
+            <a:off x="1072073" y="5081077"/>
+            <a:ext cx="5282232" cy="3055534"/>
           </a:xfrm>
           <a:prstGeom prst="rect">
             <a:avLst/>
@@ -4675,96 +4906,6 @@
     <p:extLst>
       <p:ext uri="{BB962C8B-B14F-4D97-AF65-F5344CB8AC3E}">
         <p14:creationId xmlns:p14="http://schemas.microsoft.com/office/powerpoint/2010/main" val="94307398"/>
-      </p:ext>
-    </p:extLst>
-  </p:cSld>
-  <p:clrMapOvr>
-    <a:masterClrMapping/>
-  </p:clrMapOvr>
-</p:sld>
-</file>
-
-<file path=ppt/slides/slide8.xml><?xml version="1.0" encoding="utf-8"?>
-<p:sld xmlns:a="http://schemas.openxmlformats.org/drawingml/2006/main" xmlns:r="http://schemas.openxmlformats.org/officeDocument/2006/relationships" xmlns:p="http://schemas.openxmlformats.org/presentationml/2006/main">
-  <p:cSld>
-    <p:spTree>
-      <p:nvGrpSpPr>
-        <p:cNvPr id="1" name=""/>
-        <p:cNvGrpSpPr/>
-        <p:nvPr/>
-      </p:nvGrpSpPr>
-      <p:grpSpPr>
-        <a:xfrm>
-          <a:off x="0" y="0"/>
-          <a:ext cx="0" cy="0"/>
-          <a:chOff x="0" y="0"/>
-          <a:chExt cx="0" cy="0"/>
-        </a:xfrm>
-      </p:grpSpPr>
-      <p:sp>
-        <p:nvSpPr>
-          <p:cNvPr id="3" name="TextBox 2"/>
-          <p:cNvSpPr txBox="1"/>
-          <p:nvPr/>
-        </p:nvSpPr>
-        <p:spPr>
-          <a:xfrm>
-            <a:off x="1208868" y="697424"/>
-            <a:ext cx="872355" cy="369332"/>
-          </a:xfrm>
-          <a:prstGeom prst="rect">
-            <a:avLst/>
-          </a:prstGeom>
-          <a:noFill/>
-        </p:spPr>
-        <p:txBody>
-          <a:bodyPr wrap="none" rtlCol="0">
-            <a:spAutoFit/>
-          </a:bodyPr>
-          <a:lstStyle/>
-          <a:p>
-            <a:r>
-              <a:rPr lang="en-US" dirty="0" smtClean="0"/>
-              <a:t>Fig. 2-h</a:t>
-            </a:r>
-            <a:endParaRPr lang="en-US" dirty="0"/>
-          </a:p>
-        </p:txBody>
-      </p:sp>
-      <p:pic>
-        <p:nvPicPr>
-          <p:cNvPr id="4" name="Picture 3"/>
-          <p:cNvPicPr>
-            <a:picLocks noChangeAspect="1"/>
-          </p:cNvPicPr>
-          <p:nvPr/>
-        </p:nvPicPr>
-        <p:blipFill>
-          <a:blip r:embed="rId2">
-            <a:extLst>
-              <a:ext uri="{28A0092B-C50C-407E-A947-70E740481C1C}">
-                <a14:useLocalDpi xmlns:a14="http://schemas.microsoft.com/office/drawing/2010/main" val="0"/>
-              </a:ext>
-            </a:extLst>
-          </a:blip>
-          <a:stretch>
-            <a:fillRect/>
-          </a:stretch>
-        </p:blipFill>
-        <p:spPr>
-          <a:xfrm>
-            <a:off x="810491" y="1066756"/>
-            <a:ext cx="5518672" cy="6817183"/>
-          </a:xfrm>
-          <a:prstGeom prst="rect">
-            <a:avLst/>
-          </a:prstGeom>
-        </p:spPr>
-      </p:pic>
-    </p:spTree>
-    <p:extLst>
-      <p:ext uri="{BB962C8B-B14F-4D97-AF65-F5344CB8AC3E}">
-        <p14:creationId xmlns:p14="http://schemas.microsoft.com/office/powerpoint/2010/main" val="120306710"/>
       </p:ext>
     </p:extLst>
   </p:cSld>
@@ -4791,46 +4932,91 @@
           <a:chExt cx="0" cy="0"/>
         </a:xfrm>
       </p:grpSpPr>
-      <p:pic>
-        <p:nvPicPr>
-          <p:cNvPr id="2" name="Picture 1"/>
-          <p:cNvPicPr>
-            <a:picLocks noChangeAspect="1"/>
-          </p:cNvPicPr>
+      <p:grpSp>
+        <p:nvGrpSpPr>
+          <p:cNvPr id="4" name="Group 3"/>
+          <p:cNvGrpSpPr/>
           <p:nvPr/>
-        </p:nvPicPr>
-        <p:blipFill>
-          <a:blip r:embed="rId2">
-            <a:extLst>
-              <a:ext uri="{28A0092B-C50C-407E-A947-70E740481C1C}">
-                <a14:useLocalDpi xmlns:a14="http://schemas.microsoft.com/office/drawing/2010/main" val="0"/>
-              </a:ext>
-            </a:extLst>
-          </a:blip>
-          <a:stretch>
-            <a:fillRect/>
-          </a:stretch>
-        </p:blipFill>
-        <p:spPr>
-          <a:xfrm>
-            <a:off x="0" y="1917700"/>
-            <a:ext cx="6858000" cy="5299364"/>
-          </a:xfrm>
-          <a:prstGeom prst="rect">
-            <a:avLst/>
-          </a:prstGeom>
-        </p:spPr>
-      </p:pic>
-      <p:sp>
-        <p:nvSpPr>
-          <p:cNvPr id="3" name="TextBox 2"/>
+        </p:nvGrpSpPr>
+        <p:grpSpPr>
+          <a:xfrm>
+            <a:off x="1677692" y="1069383"/>
+            <a:ext cx="3502617" cy="7005235"/>
+            <a:chOff x="1677692" y="759415"/>
+            <a:chExt cx="3502617" cy="7005235"/>
+          </a:xfrm>
+        </p:grpSpPr>
+        <p:pic>
+          <p:nvPicPr>
+            <p:cNvPr id="2" name="Picture 1"/>
+            <p:cNvPicPr>
+              <a:picLocks noChangeAspect="1"/>
+            </p:cNvPicPr>
+            <p:nvPr/>
+          </p:nvPicPr>
+          <p:blipFill>
+            <a:blip r:embed="rId2">
+              <a:extLst>
+                <a:ext uri="{28A0092B-C50C-407E-A947-70E740481C1C}">
+                  <a14:useLocalDpi xmlns:a14="http://schemas.microsoft.com/office/drawing/2010/main" val="0"/>
+                </a:ext>
+              </a:extLst>
+            </a:blip>
+            <a:stretch>
+              <a:fillRect/>
+            </a:stretch>
+          </p:blipFill>
+          <p:spPr>
+            <a:xfrm>
+              <a:off x="1677692" y="759415"/>
+              <a:ext cx="3502617" cy="3502617"/>
+            </a:xfrm>
+            <a:prstGeom prst="rect">
+              <a:avLst/>
+            </a:prstGeom>
+          </p:spPr>
+        </p:pic>
+        <p:pic>
+          <p:nvPicPr>
+            <p:cNvPr id="3" name="Picture 2"/>
+            <p:cNvPicPr>
+              <a:picLocks noChangeAspect="1"/>
+            </p:cNvPicPr>
+            <p:nvPr/>
+          </p:nvPicPr>
+          <p:blipFill>
+            <a:blip r:embed="rId3">
+              <a:extLst>
+                <a:ext uri="{28A0092B-C50C-407E-A947-70E740481C1C}">
+                  <a14:useLocalDpi xmlns:a14="http://schemas.microsoft.com/office/drawing/2010/main" val="0"/>
+                </a:ext>
+              </a:extLst>
+            </a:blip>
+            <a:stretch>
+              <a:fillRect/>
+            </a:stretch>
+          </p:blipFill>
+          <p:spPr>
+            <a:xfrm>
+              <a:off x="1677692" y="4262033"/>
+              <a:ext cx="3502617" cy="3502617"/>
+            </a:xfrm>
+            <a:prstGeom prst="rect">
+              <a:avLst/>
+            </a:prstGeom>
+          </p:spPr>
+        </p:pic>
+      </p:grpSp>
+      <p:sp>
+        <p:nvSpPr>
+          <p:cNvPr id="5" name="TextBox 4"/>
           <p:cNvSpPr txBox="1"/>
           <p:nvPr/>
         </p:nvSpPr>
         <p:spPr>
           <a:xfrm>
-            <a:off x="1100380" y="1301858"/>
-            <a:ext cx="803425" cy="369332"/>
+            <a:off x="666427" y="700051"/>
+            <a:ext cx="805029" cy="369332"/>
           </a:xfrm>
           <a:prstGeom prst="rect">
             <a:avLst/>
@@ -4845,7 +5031,7 @@
           <a:p>
             <a:r>
               <a:rPr lang="en-US" dirty="0" smtClean="0"/>
-              <a:t>Fig. 2-i</a:t>
+              <a:t>Fig. 2-j</a:t>
             </a:r>
             <a:endParaRPr lang="en-US" dirty="0"/>
           </a:p>
@@ -4854,7 +5040,7 @@
     </p:spTree>
     <p:extLst>
       <p:ext uri="{BB962C8B-B14F-4D97-AF65-F5344CB8AC3E}">
-        <p14:creationId xmlns:p14="http://schemas.microsoft.com/office/powerpoint/2010/main" val="362575055"/>
+        <p14:creationId xmlns:p14="http://schemas.microsoft.com/office/powerpoint/2010/main" val="1487053959"/>
       </p:ext>
     </p:extLst>
   </p:cSld>

</xml_diff>